<commit_message>
i hate this shit
</commit_message>
<xml_diff>
--- a/grundpraktikum2/Optik 1/Optik I.pptx
+++ b/grundpraktikum2/Optik 1/Optik I.pptx
@@ -112,6 +112,11 @@
       </a:defRPr>
     </a:lvl9pPr>
   </p:defaultTextStyle>
+  <p:extLst>
+    <p:ext uri="{EFAFB233-063F-42B5-8137-9DF3F51BA10A}">
+      <p15:sldGuideLst xmlns:p15="http://schemas.microsoft.com/office/powerpoint/2012/main"/>
+    </p:ext>
+  </p:extLst>
 </p:presentation>
 </file>
 
@@ -3910,41 +3915,54 @@
           </a:xfrm>
         </p:spPr>
       </p:pic>
-      <p:pic>
-        <p:nvPicPr>
-          <p:cNvPr id="7" name="Inhaltsplatzhalter 4">
-            <a:extLst>
-              <a:ext uri="{FF2B5EF4-FFF2-40B4-BE49-F238E27FC236}">
-                <a16:creationId xmlns:a16="http://schemas.microsoft.com/office/drawing/2014/main" id="{BF87D6D3-4769-4267-B5DE-0AF85080E252}"/>
-              </a:ext>
-            </a:extLst>
-          </p:cNvPr>
-          <p:cNvPicPr>
-            <a:picLocks noGrp="1" noChangeAspect="1"/>
-          </p:cNvPicPr>
+      <p:sp>
+        <p:nvSpPr>
+          <p:cNvPr id="3" name="Inhaltsplatzhalter 2">
+            <a:extLst>
+              <a:ext uri="{FF2B5EF4-FFF2-40B4-BE49-F238E27FC236}">
+                <a16:creationId xmlns:a16="http://schemas.microsoft.com/office/drawing/2014/main" id="{0A0E3A64-3476-4C6D-84A5-07A5FF71A018}"/>
+              </a:ext>
+            </a:extLst>
+          </p:cNvPr>
+          <p:cNvSpPr>
+            <a:spLocks noGrp="1"/>
+          </p:cNvSpPr>
           <p:nvPr>
             <p:ph sz="half" idx="1"/>
           </p:nvPr>
-        </p:nvPicPr>
-        <p:blipFill>
-          <a:blip r:embed="rId3">
-            <a:extLst>
-              <a:ext uri="{28A0092B-C50C-407E-A947-70E740481C1C}">
-                <a14:useLocalDpi xmlns:a14="http://schemas.microsoft.com/office/drawing/2010/main" val="0"/>
-              </a:ext>
-            </a:extLst>
-          </a:blip>
-          <a:stretch>
-            <a:fillRect/>
-          </a:stretch>
-        </p:blipFill>
-        <p:spPr>
-          <a:xfrm>
-            <a:off x="309488" y="2489981"/>
-            <a:ext cx="5050303" cy="3193367"/>
-          </a:xfrm>
-        </p:spPr>
-      </p:pic>
+        </p:nvSpPr>
+        <p:spPr/>
+        <p:txBody>
+          <a:bodyPr/>
+          <a:lstStyle/>
+          <a:p>
+            <a:r>
+              <a:rPr lang="de-DE" dirty="0" err="1"/>
+              <a:t>Hueir</a:t>
+            </a:r>
+            <a:r>
+              <a:rPr lang="de-DE" dirty="0"/>
+              <a:t> </a:t>
+            </a:r>
+            <a:r>
+              <a:rPr lang="de-DE" dirty="0" err="1"/>
+              <a:t>tabelle</a:t>
+            </a:r>
+            <a:r>
+              <a:rPr lang="de-DE" dirty="0"/>
+              <a:t>, muss noch in </a:t>
+            </a:r>
+            <a:r>
+              <a:rPr lang="de-DE" dirty="0" err="1"/>
+              <a:t>latex</a:t>
+            </a:r>
+            <a:r>
+              <a:rPr lang="de-DE" dirty="0"/>
+              <a:t> korrigiert werden</a:t>
+            </a:r>
+          </a:p>
+        </p:txBody>
+      </p:sp>
     </p:spTree>
     <p:extLst>
       <p:ext uri="{BB962C8B-B14F-4D97-AF65-F5344CB8AC3E}">
@@ -4003,8 +4021,8 @@
           </a:p>
         </p:txBody>
       </p:sp>
-      <mc:AlternateContent xmlns:mc="http://schemas.openxmlformats.org/markup-compatibility/2006">
-        <mc:Choice xmlns:a14="http://schemas.microsoft.com/office/drawing/2010/main" Requires="a14">
+      <mc:AlternateContent xmlns:mc="http://schemas.openxmlformats.org/markup-compatibility/2006" xmlns:a14="http://schemas.microsoft.com/office/drawing/2010/main">
+        <mc:Choice Requires="a14">
           <p:sp>
             <p:nvSpPr>
               <p:cNvPr id="6" name="Inhaltsplatzhalter 5">
@@ -4170,7 +4188,7 @@
             </p:txBody>
           </p:sp>
         </mc:Choice>
-        <mc:Fallback>
+        <mc:Fallback xmlns="">
           <p:sp>
             <p:nvSpPr>
               <p:cNvPr id="6" name="Inhaltsplatzhalter 5">
@@ -4216,10 +4234,10 @@
       </mc:AlternateContent>
       <p:pic>
         <p:nvPicPr>
-          <p:cNvPr id="12" name="Inhaltsplatzhalter 11">
-            <a:extLst>
-              <a:ext uri="{FF2B5EF4-FFF2-40B4-BE49-F238E27FC236}">
-                <a16:creationId xmlns:a16="http://schemas.microsoft.com/office/drawing/2014/main" id="{26BEF823-8FC9-4367-9516-0F66313E7D16}"/>
+          <p:cNvPr id="7" name="Inhaltsplatzhalter 6">
+            <a:extLst>
+              <a:ext uri="{FF2B5EF4-FFF2-40B4-BE49-F238E27FC236}">
+                <a16:creationId xmlns:a16="http://schemas.microsoft.com/office/drawing/2014/main" id="{3A0E121F-383D-40BB-9302-7EA2DBD3E796}"/>
               </a:ext>
             </a:extLst>
           </p:cNvPr>
@@ -4244,8 +4262,8 @@
         </p:blipFill>
         <p:spPr>
           <a:xfrm>
-            <a:off x="5849971" y="1440259"/>
-            <a:ext cx="6342029" cy="4736703"/>
+            <a:off x="5795491" y="984738"/>
+            <a:ext cx="6629703" cy="4951559"/>
           </a:xfrm>
         </p:spPr>
       </p:pic>
@@ -4412,56 +4430,221 @@
           </a:p>
         </p:txBody>
       </p:sp>
-      <p:sp>
-        <p:nvSpPr>
-          <p:cNvPr id="3" name="Inhaltsplatzhalter 2">
-            <a:extLst>
-              <a:ext uri="{FF2B5EF4-FFF2-40B4-BE49-F238E27FC236}">
-                <a16:creationId xmlns:a16="http://schemas.microsoft.com/office/drawing/2014/main" id="{214E64F1-CA89-4920-9FF0-64F38C0ACAF7}"/>
-              </a:ext>
-            </a:extLst>
-          </p:cNvPr>
-          <p:cNvSpPr>
-            <a:spLocks noGrp="1"/>
-          </p:cNvSpPr>
-          <p:nvPr>
-            <p:ph sz="half" idx="1"/>
-          </p:nvPr>
-        </p:nvSpPr>
-        <p:spPr/>
-        <p:txBody>
-          <a:bodyPr/>
-          <a:lstStyle/>
-          <a:p>
-            <a:endParaRPr lang="de-DE" dirty="0"/>
-          </a:p>
-        </p:txBody>
-      </p:sp>
-      <p:sp>
-        <p:nvSpPr>
-          <p:cNvPr id="4" name="Inhaltsplatzhalter 3">
-            <a:extLst>
-              <a:ext uri="{FF2B5EF4-FFF2-40B4-BE49-F238E27FC236}">
-                <a16:creationId xmlns:a16="http://schemas.microsoft.com/office/drawing/2014/main" id="{5E971394-0059-4ED0-B4D7-4D58F53DDCA4}"/>
-              </a:ext>
-            </a:extLst>
-          </p:cNvPr>
-          <p:cNvSpPr>
-            <a:spLocks noGrp="1"/>
-          </p:cNvSpPr>
-          <p:nvPr>
-            <p:ph sz="half" idx="2"/>
-          </p:nvPr>
-        </p:nvSpPr>
-        <p:spPr/>
-        <p:txBody>
-          <a:bodyPr/>
-          <a:lstStyle/>
-          <a:p>
-            <a:endParaRPr lang="de-DE"/>
-          </a:p>
-        </p:txBody>
-      </p:sp>
+      <mc:AlternateContent xmlns:mc="http://schemas.openxmlformats.org/markup-compatibility/2006">
+        <mc:Choice xmlns:a14="http://schemas.microsoft.com/office/drawing/2010/main" Requires="a14">
+          <p:sp>
+            <p:nvSpPr>
+              <p:cNvPr id="5" name="Inhaltsplatzhalter 4">
+                <a:extLst>
+                  <a:ext uri="{FF2B5EF4-FFF2-40B4-BE49-F238E27FC236}">
+                    <a16:creationId xmlns:a16="http://schemas.microsoft.com/office/drawing/2014/main" id="{62B27D76-E25D-4214-AC9B-F70B03C45AEF}"/>
+                  </a:ext>
+                </a:extLst>
+              </p:cNvPr>
+              <p:cNvSpPr>
+                <a:spLocks noGrp="1"/>
+              </p:cNvSpPr>
+              <p:nvPr>
+                <p:ph idx="1"/>
+              </p:nvPr>
+            </p:nvSpPr>
+            <p:spPr>
+              <a:xfrm>
+                <a:off x="841513" y="1825625"/>
+                <a:ext cx="10515600" cy="4351338"/>
+              </a:xfrm>
+            </p:spPr>
+            <p:txBody>
+              <a:bodyPr/>
+              <a:lstStyle/>
+              <a:p>
+                <a:r>
+                  <a:rPr lang="de-DE" dirty="0"/>
+                  <a:t>Hg-Doppellinie bei </a:t>
+                </a:r>
+                <a14:m>
+                  <m:oMath xmlns:m="http://schemas.openxmlformats.org/officeDocument/2006/math">
+                    <m:r>
+                      <a:rPr lang="de-DE" b="0" i="1" smtClean="0">
+                        <a:latin typeface="Cambria Math" panose="02040503050406030204" pitchFamily="18" charset="0"/>
+                      </a:rPr>
+                      <m:t>𝜆</m:t>
+                    </m:r>
+                    <m:r>
+                      <a:rPr lang="de-DE" b="0" i="1" smtClean="0">
+                        <a:latin typeface="Cambria Math" panose="02040503050406030204" pitchFamily="18" charset="0"/>
+                      </a:rPr>
+                      <m:t>=579,07 </m:t>
+                    </m:r>
+                    <m:r>
+                      <a:rPr lang="de-DE" b="0" i="1" smtClean="0">
+                        <a:latin typeface="Cambria Math" panose="02040503050406030204" pitchFamily="18" charset="0"/>
+                      </a:rPr>
+                      <m:t>𝑛𝑚</m:t>
+                    </m:r>
+                  </m:oMath>
+                </a14:m>
+                <a:endParaRPr lang="de-DE" dirty="0"/>
+              </a:p>
+              <a:p>
+                <a:r>
+                  <a:rPr lang="de-DE" dirty="0"/>
+                  <a:t>Theoretisch erwartetes Auflösungsvermögen</a:t>
+                </a:r>
+              </a:p>
+              <a:p>
+                <a:endParaRPr lang="de-DE" dirty="0"/>
+              </a:p>
+              <a:p>
+                <a:pPr marL="457200" lvl="1" indent="0">
+                  <a:buNone/>
+                </a:pPr>
+                <a14:m>
+                  <m:oMathPara xmlns:m="http://schemas.openxmlformats.org/officeDocument/2006/math">
+                    <m:oMathParaPr>
+                      <m:jc m:val="centerGroup"/>
+                    </m:oMathParaPr>
+                    <m:oMath xmlns:m="http://schemas.openxmlformats.org/officeDocument/2006/math">
+                      <m:r>
+                        <a:rPr lang="de-DE" i="1">
+                          <a:latin typeface="Cambria Math" panose="02040503050406030204" pitchFamily="18" charset="0"/>
+                        </a:rPr>
+                        <m:t>𝐴</m:t>
+                      </m:r>
+                      <m:r>
+                        <a:rPr lang="de-DE" i="1">
+                          <a:latin typeface="Cambria Math" panose="02040503050406030204" pitchFamily="18" charset="0"/>
+                        </a:rPr>
+                        <m:t>= </m:t>
+                      </m:r>
+                      <m:f>
+                        <m:fPr>
+                          <m:ctrlPr>
+                            <a:rPr lang="de-DE" i="1">
+                              <a:latin typeface="Cambria Math" panose="02040503050406030204" pitchFamily="18" charset="0"/>
+                            </a:rPr>
+                          </m:ctrlPr>
+                        </m:fPr>
+                        <m:num>
+                          <m:r>
+                            <a:rPr lang="de-DE" i="1">
+                              <a:latin typeface="Cambria Math" panose="02040503050406030204" pitchFamily="18" charset="0"/>
+                            </a:rPr>
+                            <m:t>579,1 </m:t>
+                          </m:r>
+                          <m:r>
+                            <a:rPr lang="de-DE" i="1">
+                              <a:latin typeface="Cambria Math" panose="02040503050406030204" pitchFamily="18" charset="0"/>
+                            </a:rPr>
+                            <m:t>𝑛𝑚</m:t>
+                          </m:r>
+                        </m:num>
+                        <m:den>
+                          <m:r>
+                            <a:rPr lang="de-DE" i="1">
+                              <a:latin typeface="Cambria Math" panose="02040503050406030204" pitchFamily="18" charset="0"/>
+                            </a:rPr>
+                            <m:t>2,1 </m:t>
+                          </m:r>
+                          <m:r>
+                            <a:rPr lang="de-DE" i="1">
+                              <a:latin typeface="Cambria Math" panose="02040503050406030204" pitchFamily="18" charset="0"/>
+                            </a:rPr>
+                            <m:t>𝑛𝑚</m:t>
+                          </m:r>
+                        </m:den>
+                      </m:f>
+                      <m:r>
+                        <a:rPr lang="de-DE" i="1">
+                          <a:latin typeface="Cambria Math" panose="02040503050406030204" pitchFamily="18" charset="0"/>
+                        </a:rPr>
+                        <m:t>≈276</m:t>
+                      </m:r>
+                    </m:oMath>
+                  </m:oMathPara>
+                </a14:m>
+                <a:endParaRPr lang="de-DE" dirty="0"/>
+              </a:p>
+              <a:p>
+                <a:endParaRPr lang="de-DE" dirty="0"/>
+              </a:p>
+              <a:p>
+                <a:endParaRPr lang="de-DE" dirty="0"/>
+              </a:p>
+              <a:p>
+                <a:endParaRPr lang="de-DE" dirty="0"/>
+              </a:p>
+              <a:p>
+                <a:endParaRPr lang="de-DE" dirty="0"/>
+              </a:p>
+              <a:p>
+                <a:endParaRPr lang="de-DE" dirty="0"/>
+              </a:p>
+              <a:p>
+                <a:endParaRPr lang="de-DE" dirty="0"/>
+              </a:p>
+              <a:p>
+                <a:endParaRPr lang="de-DE" dirty="0"/>
+              </a:p>
+              <a:p>
+                <a:pPr marL="457200" lvl="1" indent="0">
+                  <a:buNone/>
+                </a:pPr>
+                <a:endParaRPr lang="de-DE" dirty="0"/>
+              </a:p>
+              <a:p>
+                <a:pPr marL="457200" lvl="1" indent="0">
+                  <a:buNone/>
+                </a:pPr>
+                <a:endParaRPr lang="de-DE" dirty="0"/>
+              </a:p>
+            </p:txBody>
+          </p:sp>
+        </mc:Choice>
+        <mc:Fallback>
+          <p:sp>
+            <p:nvSpPr>
+              <p:cNvPr id="5" name="Inhaltsplatzhalter 4">
+                <a:extLst>
+                  <a:ext uri="{FF2B5EF4-FFF2-40B4-BE49-F238E27FC236}">
+                    <a16:creationId xmlns:a16="http://schemas.microsoft.com/office/drawing/2014/main" id="{62B27D76-E25D-4214-AC9B-F70B03C45AEF}"/>
+                  </a:ext>
+                </a:extLst>
+              </p:cNvPr>
+              <p:cNvSpPr>
+                <a:spLocks noGrp="1" noRot="1" noChangeAspect="1" noMove="1" noResize="1" noEditPoints="1" noAdjustHandles="1" noChangeArrowheads="1" noChangeShapeType="1" noTextEdit="1"/>
+              </p:cNvSpPr>
+              <p:nvPr>
+                <p:ph idx="1"/>
+              </p:nvPr>
+            </p:nvSpPr>
+            <p:spPr>
+              <a:xfrm>
+                <a:off x="841513" y="1825625"/>
+                <a:ext cx="10515600" cy="4351338"/>
+              </a:xfrm>
+              <a:blipFill>
+                <a:blip r:embed="rId2"/>
+                <a:stretch>
+                  <a:fillRect l="-1043" t="-2241"/>
+                </a:stretch>
+              </a:blipFill>
+            </p:spPr>
+            <p:txBody>
+              <a:bodyPr/>
+              <a:lstStyle/>
+              <a:p>
+                <a:r>
+                  <a:rPr lang="de-DE">
+                    <a:noFill/>
+                  </a:rPr>
+                  <a:t> </a:t>
+                </a:r>
+              </a:p>
+            </p:txBody>
+          </p:sp>
+        </mc:Fallback>
+      </mc:AlternateContent>
     </p:spTree>
     <p:extLst>
       <p:ext uri="{BB962C8B-B14F-4D97-AF65-F5344CB8AC3E}">

</xml_diff>

<commit_message>
Präsentation Gitter 1. Teil
</commit_message>
<xml_diff>
--- a/grundpraktikum2/Optik 1/Optik I.pptx
+++ b/grundpraktikum2/Optik 1/Optik I.pptx
@@ -14,6 +14,10 @@
     <p:sldId id="263" r:id="rId8"/>
     <p:sldId id="264" r:id="rId9"/>
     <p:sldId id="265" r:id="rId10"/>
+    <p:sldId id="266" r:id="rId11"/>
+    <p:sldId id="267" r:id="rId12"/>
+    <p:sldId id="268" r:id="rId13"/>
+    <p:sldId id="269" r:id="rId14"/>
   </p:sldIdLst>
   <p:sldSz cx="12192000" cy="6858000"/>
   <p:notesSz cx="6858000" cy="9144000"/>
@@ -3420,6 +3424,1314 @@
     <p:extLst>
       <p:ext uri="{BB962C8B-B14F-4D97-AF65-F5344CB8AC3E}">
         <p14:creationId xmlns:p14="http://schemas.microsoft.com/office/powerpoint/2010/main" val="1500047312"/>
+      </p:ext>
+    </p:extLst>
+  </p:cSld>
+  <p:clrMapOvr>
+    <a:masterClrMapping/>
+  </p:clrMapOvr>
+</p:sld>
+</file>
+
+<file path=ppt/slides/slide10.xml><?xml version="1.0" encoding="utf-8"?>
+<p:sld xmlns:a="http://schemas.openxmlformats.org/drawingml/2006/main" xmlns:r="http://schemas.openxmlformats.org/officeDocument/2006/relationships" xmlns:p="http://schemas.openxmlformats.org/presentationml/2006/main">
+  <p:cSld>
+    <p:spTree>
+      <p:nvGrpSpPr>
+        <p:cNvPr id="1" name=""/>
+        <p:cNvGrpSpPr/>
+        <p:nvPr/>
+      </p:nvGrpSpPr>
+      <p:grpSpPr>
+        <a:xfrm>
+          <a:off x="0" y="0"/>
+          <a:ext cx="0" cy="0"/>
+          <a:chOff x="0" y="0"/>
+          <a:chExt cx="0" cy="0"/>
+        </a:xfrm>
+      </p:grpSpPr>
+      <p:sp>
+        <p:nvSpPr>
+          <p:cNvPr id="2" name="Titel 1">
+            <a:extLst>
+              <a:ext uri="{FF2B5EF4-FFF2-40B4-BE49-F238E27FC236}">
+                <a16:creationId xmlns:a16="http://schemas.microsoft.com/office/drawing/2014/main" id="{AFBAA1B4-FFB3-4939-834D-54C1DC63694B}"/>
+              </a:ext>
+            </a:extLst>
+          </p:cNvPr>
+          <p:cNvSpPr>
+            <a:spLocks noGrp="1"/>
+          </p:cNvSpPr>
+          <p:nvPr>
+            <p:ph type="title"/>
+          </p:nvPr>
+        </p:nvSpPr>
+        <p:spPr/>
+        <p:txBody>
+          <a:bodyPr/>
+          <a:lstStyle/>
+          <a:p>
+            <a:r>
+              <a:rPr lang="de-DE" dirty="0"/>
+              <a:t>Gitter - Grundlagen</a:t>
+            </a:r>
+          </a:p>
+        </p:txBody>
+      </p:sp>
+      <mc:AlternateContent xmlns:mc="http://schemas.openxmlformats.org/markup-compatibility/2006">
+        <mc:Choice xmlns:a14="http://schemas.microsoft.com/office/drawing/2010/main" Requires="a14">
+          <p:sp>
+            <p:nvSpPr>
+              <p:cNvPr id="3" name="Inhaltsplatzhalter 2">
+                <a:extLst>
+                  <a:ext uri="{FF2B5EF4-FFF2-40B4-BE49-F238E27FC236}">
+                    <a16:creationId xmlns:a16="http://schemas.microsoft.com/office/drawing/2014/main" id="{B5186058-C979-4F4A-A468-5D9D3A7257CB}"/>
+                  </a:ext>
+                </a:extLst>
+              </p:cNvPr>
+              <p:cNvSpPr>
+                <a:spLocks noGrp="1"/>
+              </p:cNvSpPr>
+              <p:nvPr>
+                <p:ph idx="1"/>
+              </p:nvPr>
+            </p:nvSpPr>
+            <p:spPr>
+              <a:xfrm>
+                <a:off x="838200" y="1825625"/>
+                <a:ext cx="4818321" cy="4351338"/>
+              </a:xfrm>
+            </p:spPr>
+            <p:txBody>
+              <a:bodyPr>
+                <a:normAutofit/>
+              </a:bodyPr>
+              <a:lstStyle/>
+              <a:p>
+                <a:r>
+                  <a:rPr lang="de-DE" dirty="0"/>
+                  <a:t>Maximumsbedingung: </a:t>
+                </a:r>
+                <a:endParaRPr lang="de-DE" b="0" i="1" dirty="0">
+                  <a:latin typeface="Cambria Math" panose="02040503050406030204" pitchFamily="18" charset="0"/>
+                </a:endParaRPr>
+              </a:p>
+              <a:p>
+                <a:pPr marL="0" indent="0">
+                  <a:buNone/>
+                </a:pPr>
+                <a14:m>
+                  <m:oMathPara xmlns:m="http://schemas.openxmlformats.org/officeDocument/2006/math">
+                    <m:oMathParaPr>
+                      <m:jc m:val="centerGroup"/>
+                    </m:oMathParaPr>
+                    <m:oMath xmlns:m="http://schemas.openxmlformats.org/officeDocument/2006/math">
+                      <m:r>
+                        <a:rPr lang="de-DE" b="0" i="1" smtClean="0">
+                          <a:latin typeface="Cambria Math" panose="02040503050406030204" pitchFamily="18" charset="0"/>
+                        </a:rPr>
+                        <m:t>𝑛</m:t>
+                      </m:r>
+                      <m:r>
+                        <a:rPr lang="de-DE" b="0" i="1" smtClean="0">
+                          <a:latin typeface="Cambria Math" panose="02040503050406030204" pitchFamily="18" charset="0"/>
+                        </a:rPr>
+                        <m:t> </m:t>
+                      </m:r>
+                      <m:r>
+                        <a:rPr lang="de-DE" b="0" i="1" smtClean="0">
+                          <a:latin typeface="Cambria Math" panose="02040503050406030204" pitchFamily="18" charset="0"/>
+                        </a:rPr>
+                        <m:t>𝜆</m:t>
+                      </m:r>
+                      <m:r>
+                        <a:rPr lang="de-DE" b="0" i="1" smtClean="0">
+                          <a:latin typeface="Cambria Math" panose="02040503050406030204" pitchFamily="18" charset="0"/>
+                        </a:rPr>
+                        <m:t>=</m:t>
+                      </m:r>
+                      <m:r>
+                        <a:rPr lang="de-DE" b="0" i="1" smtClean="0">
+                          <a:latin typeface="Cambria Math" panose="02040503050406030204" pitchFamily="18" charset="0"/>
+                        </a:rPr>
+                        <m:t>𝑑</m:t>
+                      </m:r>
+                      <m:func>
+                        <m:funcPr>
+                          <m:ctrlPr>
+                            <a:rPr lang="de-DE" b="0" i="1" smtClean="0">
+                              <a:latin typeface="Cambria Math" panose="02040503050406030204" pitchFamily="18" charset="0"/>
+                            </a:rPr>
+                          </m:ctrlPr>
+                        </m:funcPr>
+                        <m:fName>
+                          <m:r>
+                            <m:rPr>
+                              <m:sty m:val="p"/>
+                            </m:rPr>
+                            <a:rPr lang="de-DE" b="0" i="0" smtClean="0">
+                              <a:latin typeface="Cambria Math" panose="02040503050406030204" pitchFamily="18" charset="0"/>
+                            </a:rPr>
+                            <m:t>sin</m:t>
+                          </m:r>
+                        </m:fName>
+                        <m:e>
+                          <m:r>
+                            <a:rPr lang="de-DE" b="0" i="1" smtClean="0">
+                              <a:latin typeface="Cambria Math" panose="02040503050406030204" pitchFamily="18" charset="0"/>
+                            </a:rPr>
+                            <m:t>𝜃</m:t>
+                          </m:r>
+                        </m:e>
+                      </m:func>
+                    </m:oMath>
+                  </m:oMathPara>
+                </a14:m>
+                <a:endParaRPr lang="de-DE" dirty="0"/>
+              </a:p>
+              <a:p>
+                <a:endParaRPr lang="de-DE" dirty="0"/>
+              </a:p>
+              <a:p>
+                <a:r>
+                  <a:rPr lang="de-DE" dirty="0"/>
+                  <a:t>Allgemeiner: </a:t>
+                </a:r>
+              </a:p>
+              <a:p>
+                <a:pPr marL="0" indent="0">
+                  <a:buNone/>
+                </a:pPr>
+                <a14:m>
+                  <m:oMathPara xmlns:m="http://schemas.openxmlformats.org/officeDocument/2006/math">
+                    <m:oMathParaPr>
+                      <m:jc m:val="centerGroup"/>
+                    </m:oMathParaPr>
+                    <m:oMath xmlns:m="http://schemas.openxmlformats.org/officeDocument/2006/math">
+                      <m:r>
+                        <a:rPr lang="de-DE" b="0" i="1" smtClean="0">
+                          <a:latin typeface="Cambria Math" panose="02040503050406030204" pitchFamily="18" charset="0"/>
+                        </a:rPr>
+                        <m:t>𝑑</m:t>
+                      </m:r>
+                      <m:r>
+                        <a:rPr lang="de-DE" b="0" i="1" smtClean="0">
+                          <a:latin typeface="Cambria Math" panose="02040503050406030204" pitchFamily="18" charset="0"/>
+                        </a:rPr>
+                        <m:t>(</m:t>
+                      </m:r>
+                      <m:r>
+                        <a:rPr lang="de-DE" b="0" i="1" smtClean="0">
+                          <a:latin typeface="Cambria Math" panose="02040503050406030204" pitchFamily="18" charset="0"/>
+                        </a:rPr>
+                        <m:t>𝑠𝑖𝑛</m:t>
+                      </m:r>
+                      <m:r>
+                        <a:rPr lang="de-DE" b="0" i="1" smtClean="0">
+                          <a:latin typeface="Cambria Math" panose="02040503050406030204" pitchFamily="18" charset="0"/>
+                        </a:rPr>
+                        <m:t>𝜑</m:t>
+                      </m:r>
+                      <m:r>
+                        <a:rPr lang="de-DE" b="0" i="1" smtClean="0">
+                          <a:latin typeface="Cambria Math" panose="02040503050406030204" pitchFamily="18" charset="0"/>
+                        </a:rPr>
+                        <m:t>+</m:t>
+                      </m:r>
+                      <m:func>
+                        <m:funcPr>
+                          <m:ctrlPr>
+                            <a:rPr lang="de-DE" b="0" i="1" smtClean="0">
+                              <a:latin typeface="Cambria Math" panose="02040503050406030204" pitchFamily="18" charset="0"/>
+                            </a:rPr>
+                          </m:ctrlPr>
+                        </m:funcPr>
+                        <m:fName>
+                          <m:r>
+                            <m:rPr>
+                              <m:sty m:val="p"/>
+                            </m:rPr>
+                            <a:rPr lang="de-DE" b="0" i="0" smtClean="0">
+                              <a:latin typeface="Cambria Math" panose="02040503050406030204" pitchFamily="18" charset="0"/>
+                            </a:rPr>
+                            <m:t>sin</m:t>
+                          </m:r>
+                        </m:fName>
+                        <m:e>
+                          <m:d>
+                            <m:dPr>
+                              <m:ctrlPr>
+                                <a:rPr lang="de-DE" b="0" i="1" smtClean="0">
+                                  <a:latin typeface="Cambria Math" panose="02040503050406030204" pitchFamily="18" charset="0"/>
+                                </a:rPr>
+                              </m:ctrlPr>
+                            </m:dPr>
+                            <m:e>
+                              <m:r>
+                                <a:rPr lang="de-DE" b="0" i="1" smtClean="0">
+                                  <a:latin typeface="Cambria Math" panose="02040503050406030204" pitchFamily="18" charset="0"/>
+                                </a:rPr>
+                                <m:t>𝜃</m:t>
+                              </m:r>
+                              <m:r>
+                                <a:rPr lang="de-DE" b="0" i="1" smtClean="0">
+                                  <a:latin typeface="Cambria Math" panose="02040503050406030204" pitchFamily="18" charset="0"/>
+                                </a:rPr>
+                                <m:t>−</m:t>
+                              </m:r>
+                              <m:r>
+                                <a:rPr lang="de-DE" b="0" i="1" smtClean="0">
+                                  <a:latin typeface="Cambria Math" panose="02040503050406030204" pitchFamily="18" charset="0"/>
+                                </a:rPr>
+                                <m:t>𝜑</m:t>
+                              </m:r>
+                            </m:e>
+                          </m:d>
+                        </m:e>
+                      </m:func>
+                      <m:r>
+                        <a:rPr lang="de-DE" b="0" i="1" smtClean="0">
+                          <a:latin typeface="Cambria Math" panose="02040503050406030204" pitchFamily="18" charset="0"/>
+                        </a:rPr>
+                        <m:t>=</m:t>
+                      </m:r>
+                      <m:r>
+                        <a:rPr lang="de-DE" b="0" i="1" smtClean="0">
+                          <a:latin typeface="Cambria Math" panose="02040503050406030204" pitchFamily="18" charset="0"/>
+                        </a:rPr>
+                        <m:t>𝑛</m:t>
+                      </m:r>
+                      <m:r>
+                        <a:rPr lang="de-DE" b="0" i="1" smtClean="0">
+                          <a:latin typeface="Cambria Math" panose="02040503050406030204" pitchFamily="18" charset="0"/>
+                        </a:rPr>
+                        <m:t> </m:t>
+                      </m:r>
+                      <m:r>
+                        <a:rPr lang="de-DE" b="0" i="1" smtClean="0">
+                          <a:latin typeface="Cambria Math" panose="02040503050406030204" pitchFamily="18" charset="0"/>
+                        </a:rPr>
+                        <m:t>𝜆</m:t>
+                      </m:r>
+                    </m:oMath>
+                  </m:oMathPara>
+                </a14:m>
+                <a:endParaRPr lang="de-DE" dirty="0"/>
+              </a:p>
+              <a:p>
+                <a:endParaRPr lang="de-DE" dirty="0"/>
+              </a:p>
+              <a:p>
+                <a:r>
+                  <a:rPr lang="de-DE" dirty="0"/>
+                  <a:t>Auflösungsvermögen: </a:t>
+                </a:r>
+                <a:endParaRPr lang="de-DE" b="0" i="1" dirty="0">
+                  <a:latin typeface="Cambria Math" panose="02040503050406030204" pitchFamily="18" charset="0"/>
+                </a:endParaRPr>
+              </a:p>
+              <a:p>
+                <a:pPr marL="0" indent="0">
+                  <a:buNone/>
+                </a:pPr>
+                <a14:m>
+                  <m:oMathPara xmlns:m="http://schemas.openxmlformats.org/officeDocument/2006/math">
+                    <m:oMathParaPr>
+                      <m:jc m:val="centerGroup"/>
+                    </m:oMathParaPr>
+                    <m:oMath xmlns:m="http://schemas.openxmlformats.org/officeDocument/2006/math">
+                      <m:r>
+                        <a:rPr lang="de-DE" b="0" i="1" smtClean="0">
+                          <a:latin typeface="Cambria Math" panose="02040503050406030204" pitchFamily="18" charset="0"/>
+                        </a:rPr>
+                        <m:t>𝐴</m:t>
+                      </m:r>
+                      <m:r>
+                        <a:rPr lang="de-DE" b="0" i="1" smtClean="0">
+                          <a:latin typeface="Cambria Math" panose="02040503050406030204" pitchFamily="18" charset="0"/>
+                        </a:rPr>
+                        <m:t>= </m:t>
+                      </m:r>
+                      <m:f>
+                        <m:fPr>
+                          <m:ctrlPr>
+                            <a:rPr lang="de-DE" b="0" i="1" smtClean="0">
+                              <a:latin typeface="Cambria Math" panose="02040503050406030204" pitchFamily="18" charset="0"/>
+                            </a:rPr>
+                          </m:ctrlPr>
+                        </m:fPr>
+                        <m:num>
+                          <m:r>
+                            <a:rPr lang="de-DE" b="0" i="1" smtClean="0">
+                              <a:latin typeface="Cambria Math" panose="02040503050406030204" pitchFamily="18" charset="0"/>
+                            </a:rPr>
+                            <m:t>𝜆</m:t>
+                          </m:r>
+                        </m:num>
+                        <m:den>
+                          <m:r>
+                            <m:rPr>
+                              <m:sty m:val="p"/>
+                            </m:rPr>
+                            <a:rPr lang="de-DE" b="0" i="0" smtClean="0">
+                              <a:latin typeface="Cambria Math" panose="02040503050406030204" pitchFamily="18" charset="0"/>
+                            </a:rPr>
+                            <m:t>Δ</m:t>
+                          </m:r>
+                          <m:r>
+                            <a:rPr lang="de-DE" b="0" i="1" smtClean="0">
+                              <a:latin typeface="Cambria Math" panose="02040503050406030204" pitchFamily="18" charset="0"/>
+                            </a:rPr>
+                            <m:t>𝜆</m:t>
+                          </m:r>
+                        </m:den>
+                      </m:f>
+                      <m:r>
+                        <a:rPr lang="de-DE" b="0" i="1" smtClean="0">
+                          <a:latin typeface="Cambria Math" panose="02040503050406030204" pitchFamily="18" charset="0"/>
+                        </a:rPr>
+                        <m:t>=</m:t>
+                      </m:r>
+                      <m:r>
+                        <a:rPr lang="de-DE" b="0" i="1" smtClean="0">
+                          <a:latin typeface="Cambria Math" panose="02040503050406030204" pitchFamily="18" charset="0"/>
+                        </a:rPr>
+                        <m:t>𝑛</m:t>
+                      </m:r>
+                      <m:r>
+                        <a:rPr lang="de-DE" b="0" i="1" smtClean="0">
+                          <a:latin typeface="Cambria Math" panose="02040503050406030204" pitchFamily="18" charset="0"/>
+                        </a:rPr>
+                        <m:t> </m:t>
+                      </m:r>
+                      <m:r>
+                        <a:rPr lang="de-DE" b="0" i="1" smtClean="0">
+                          <a:latin typeface="Cambria Math" panose="02040503050406030204" pitchFamily="18" charset="0"/>
+                        </a:rPr>
+                        <m:t>𝑁</m:t>
+                      </m:r>
+                    </m:oMath>
+                  </m:oMathPara>
+                </a14:m>
+                <a:endParaRPr lang="de-DE" dirty="0"/>
+              </a:p>
+              <a:p>
+                <a:endParaRPr lang="de-DE" dirty="0"/>
+              </a:p>
+            </p:txBody>
+          </p:sp>
+        </mc:Choice>
+        <mc:Fallback>
+          <p:sp>
+            <p:nvSpPr>
+              <p:cNvPr id="3" name="Inhaltsplatzhalter 2">
+                <a:extLst>
+                  <a:ext uri="{FF2B5EF4-FFF2-40B4-BE49-F238E27FC236}">
+                    <a16:creationId xmlns:a16="http://schemas.microsoft.com/office/drawing/2014/main" id="{B5186058-C979-4F4A-A468-5D9D3A7257CB}"/>
+                  </a:ext>
+                </a:extLst>
+              </p:cNvPr>
+              <p:cNvSpPr>
+                <a:spLocks noGrp="1" noRot="1" noChangeAspect="1" noMove="1" noResize="1" noEditPoints="1" noAdjustHandles="1" noChangeArrowheads="1" noChangeShapeType="1" noTextEdit="1"/>
+              </p:cNvSpPr>
+              <p:nvPr>
+                <p:ph idx="1"/>
+              </p:nvPr>
+            </p:nvSpPr>
+            <p:spPr>
+              <a:xfrm>
+                <a:off x="838200" y="1825625"/>
+                <a:ext cx="4818321" cy="4351338"/>
+              </a:xfrm>
+              <a:blipFill>
+                <a:blip r:embed="rId2"/>
+                <a:stretch>
+                  <a:fillRect l="-2278" t="-2241"/>
+                </a:stretch>
+              </a:blipFill>
+            </p:spPr>
+            <p:txBody>
+              <a:bodyPr/>
+              <a:lstStyle/>
+              <a:p>
+                <a:r>
+                  <a:rPr lang="de-DE">
+                    <a:noFill/>
+                  </a:rPr>
+                  <a:t> </a:t>
+                </a:r>
+              </a:p>
+            </p:txBody>
+          </p:sp>
+        </mc:Fallback>
+      </mc:AlternateContent>
+      <p:pic>
+        <p:nvPicPr>
+          <p:cNvPr id="5" name="Grafik 4">
+            <a:extLst>
+              <a:ext uri="{FF2B5EF4-FFF2-40B4-BE49-F238E27FC236}">
+                <a16:creationId xmlns:a16="http://schemas.microsoft.com/office/drawing/2014/main" id="{FDD0C044-87A7-473D-B8C0-ECB207F84948}"/>
+              </a:ext>
+            </a:extLst>
+          </p:cNvPr>
+          <p:cNvPicPr>
+            <a:picLocks noChangeAspect="1"/>
+          </p:cNvPicPr>
+          <p:nvPr/>
+        </p:nvPicPr>
+        <p:blipFill>
+          <a:blip r:embed="rId3">
+            <a:extLst>
+              <a:ext uri="{28A0092B-C50C-407E-A947-70E740481C1C}">
+                <a14:useLocalDpi xmlns:a14="http://schemas.microsoft.com/office/drawing/2010/main" val="0"/>
+              </a:ext>
+            </a:extLst>
+          </a:blip>
+          <a:stretch>
+            <a:fillRect/>
+          </a:stretch>
+        </p:blipFill>
+        <p:spPr>
+          <a:xfrm>
+            <a:off x="5486400" y="2256061"/>
+            <a:ext cx="6386010" cy="2826301"/>
+          </a:xfrm>
+          <a:prstGeom prst="rect">
+            <a:avLst/>
+          </a:prstGeom>
+        </p:spPr>
+      </p:pic>
+    </p:spTree>
+    <p:extLst>
+      <p:ext uri="{BB962C8B-B14F-4D97-AF65-F5344CB8AC3E}">
+        <p14:creationId xmlns:p14="http://schemas.microsoft.com/office/powerpoint/2010/main" val="760166839"/>
+      </p:ext>
+    </p:extLst>
+  </p:cSld>
+  <p:clrMapOvr>
+    <a:masterClrMapping/>
+  </p:clrMapOvr>
+</p:sld>
+</file>
+
+<file path=ppt/slides/slide11.xml><?xml version="1.0" encoding="utf-8"?>
+<p:sld xmlns:a="http://schemas.openxmlformats.org/drawingml/2006/main" xmlns:r="http://schemas.openxmlformats.org/officeDocument/2006/relationships" xmlns:p="http://schemas.openxmlformats.org/presentationml/2006/main">
+  <p:cSld>
+    <p:spTree>
+      <p:nvGrpSpPr>
+        <p:cNvPr id="1" name=""/>
+        <p:cNvGrpSpPr/>
+        <p:nvPr/>
+      </p:nvGrpSpPr>
+      <p:grpSpPr>
+        <a:xfrm>
+          <a:off x="0" y="0"/>
+          <a:ext cx="0" cy="0"/>
+          <a:chOff x="0" y="0"/>
+          <a:chExt cx="0" cy="0"/>
+        </a:xfrm>
+      </p:grpSpPr>
+      <p:sp>
+        <p:nvSpPr>
+          <p:cNvPr id="2" name="Titel 1">
+            <a:extLst>
+              <a:ext uri="{FF2B5EF4-FFF2-40B4-BE49-F238E27FC236}">
+                <a16:creationId xmlns:a16="http://schemas.microsoft.com/office/drawing/2014/main" id="{40B30099-4E79-43A9-9B94-F4F7561F6409}"/>
+              </a:ext>
+            </a:extLst>
+          </p:cNvPr>
+          <p:cNvSpPr>
+            <a:spLocks noGrp="1"/>
+          </p:cNvSpPr>
+          <p:nvPr>
+            <p:ph type="title"/>
+          </p:nvPr>
+        </p:nvSpPr>
+        <p:spPr/>
+        <p:txBody>
+          <a:bodyPr/>
+          <a:lstStyle/>
+          <a:p>
+            <a:r>
+              <a:rPr lang="de-DE" dirty="0"/>
+              <a:t>Rauschmessung Gitter</a:t>
+            </a:r>
+          </a:p>
+        </p:txBody>
+      </p:sp>
+      <p:pic>
+        <p:nvPicPr>
+          <p:cNvPr id="5" name="Inhaltsplatzhalter 4">
+            <a:extLst>
+              <a:ext uri="{FF2B5EF4-FFF2-40B4-BE49-F238E27FC236}">
+                <a16:creationId xmlns:a16="http://schemas.microsoft.com/office/drawing/2014/main" id="{1959F855-4DB0-43D3-A4A4-2B0C4B4A8A5C}"/>
+              </a:ext>
+            </a:extLst>
+          </p:cNvPr>
+          <p:cNvPicPr>
+            <a:picLocks noGrp="1" noChangeAspect="1"/>
+          </p:cNvPicPr>
+          <p:nvPr>
+            <p:ph idx="1"/>
+          </p:nvPr>
+        </p:nvPicPr>
+        <p:blipFill>
+          <a:blip r:embed="rId2">
+            <a:extLst>
+              <a:ext uri="{28A0092B-C50C-407E-A947-70E740481C1C}">
+                <a14:useLocalDpi xmlns:a14="http://schemas.microsoft.com/office/drawing/2010/main" val="0"/>
+              </a:ext>
+            </a:extLst>
+          </a:blip>
+          <a:stretch>
+            <a:fillRect/>
+          </a:stretch>
+        </p:blipFill>
+        <p:spPr>
+          <a:xfrm>
+            <a:off x="5572067" y="1690688"/>
+            <a:ext cx="5511252" cy="4116217"/>
+          </a:xfrm>
+        </p:spPr>
+      </p:pic>
+      <p:pic>
+        <p:nvPicPr>
+          <p:cNvPr id="7" name="Grafik 6">
+            <a:extLst>
+              <a:ext uri="{FF2B5EF4-FFF2-40B4-BE49-F238E27FC236}">
+                <a16:creationId xmlns:a16="http://schemas.microsoft.com/office/drawing/2014/main" id="{6E7070AE-3DF6-44AA-9AE6-BAB0AF6EBF9F}"/>
+              </a:ext>
+            </a:extLst>
+          </p:cNvPr>
+          <p:cNvPicPr>
+            <a:picLocks noChangeAspect="1"/>
+          </p:cNvPicPr>
+          <p:nvPr/>
+        </p:nvPicPr>
+        <p:blipFill>
+          <a:blip r:embed="rId3">
+            <a:extLst>
+              <a:ext uri="{28A0092B-C50C-407E-A947-70E740481C1C}">
+                <a14:useLocalDpi xmlns:a14="http://schemas.microsoft.com/office/drawing/2010/main" val="0"/>
+              </a:ext>
+            </a:extLst>
+          </a:blip>
+          <a:stretch>
+            <a:fillRect/>
+          </a:stretch>
+        </p:blipFill>
+        <p:spPr>
+          <a:xfrm>
+            <a:off x="900718" y="2322465"/>
+            <a:ext cx="1477695" cy="3484440"/>
+          </a:xfrm>
+          <a:prstGeom prst="rect">
+            <a:avLst/>
+          </a:prstGeom>
+        </p:spPr>
+      </p:pic>
+      <p:sp>
+        <p:nvSpPr>
+          <p:cNvPr id="8" name="Textfeld 7">
+            <a:extLst>
+              <a:ext uri="{FF2B5EF4-FFF2-40B4-BE49-F238E27FC236}">
+                <a16:creationId xmlns:a16="http://schemas.microsoft.com/office/drawing/2014/main" id="{CE0FD2F6-9C6A-467A-AA42-A0B0C4194F08}"/>
+              </a:ext>
+            </a:extLst>
+          </p:cNvPr>
+          <p:cNvSpPr txBox="1"/>
+          <p:nvPr/>
+        </p:nvSpPr>
+        <p:spPr>
+          <a:xfrm>
+            <a:off x="2720051" y="2322465"/>
+            <a:ext cx="1302151" cy="646331"/>
+          </a:xfrm>
+          <a:prstGeom prst="rect">
+            <a:avLst/>
+          </a:prstGeom>
+          <a:noFill/>
+        </p:spPr>
+        <p:txBody>
+          <a:bodyPr wrap="none" rtlCol="0">
+            <a:spAutoFit/>
+          </a:bodyPr>
+          <a:lstStyle/>
+          <a:p>
+            <a:r>
+              <a:rPr lang="de-DE" dirty="0"/>
+              <a:t>Mittelwert: </a:t>
+            </a:r>
+          </a:p>
+          <a:p>
+            <a:r>
+              <a:rPr lang="de-DE" dirty="0"/>
+              <a:t>84° 32,5‘</a:t>
+            </a:r>
+          </a:p>
+        </p:txBody>
+      </p:sp>
+      <p:sp>
+        <p:nvSpPr>
+          <p:cNvPr id="9" name="Textfeld 8">
+            <a:extLst>
+              <a:ext uri="{FF2B5EF4-FFF2-40B4-BE49-F238E27FC236}">
+                <a16:creationId xmlns:a16="http://schemas.microsoft.com/office/drawing/2014/main" id="{66F478C3-4518-4A18-8AF7-C78327C75CFC}"/>
+              </a:ext>
+            </a:extLst>
+          </p:cNvPr>
+          <p:cNvSpPr txBox="1"/>
+          <p:nvPr/>
+        </p:nvSpPr>
+        <p:spPr>
+          <a:xfrm>
+            <a:off x="2720051" y="3600573"/>
+            <a:ext cx="2278637" cy="646331"/>
+          </a:xfrm>
+          <a:prstGeom prst="rect">
+            <a:avLst/>
+          </a:prstGeom>
+          <a:noFill/>
+        </p:spPr>
+        <p:txBody>
+          <a:bodyPr wrap="none" rtlCol="0">
+            <a:spAutoFit/>
+          </a:bodyPr>
+          <a:lstStyle/>
+          <a:p>
+            <a:r>
+              <a:rPr lang="de-DE" dirty="0"/>
+              <a:t>Standardabweichung: </a:t>
+            </a:r>
+          </a:p>
+          <a:p>
+            <a:r>
+              <a:rPr lang="de-DE" dirty="0"/>
+              <a:t>1,02‘</a:t>
+            </a:r>
+          </a:p>
+        </p:txBody>
+      </p:sp>
+    </p:spTree>
+    <p:extLst>
+      <p:ext uri="{BB962C8B-B14F-4D97-AF65-F5344CB8AC3E}">
+        <p14:creationId xmlns:p14="http://schemas.microsoft.com/office/powerpoint/2010/main" val="1398053305"/>
+      </p:ext>
+    </p:extLst>
+  </p:cSld>
+  <p:clrMapOvr>
+    <a:masterClrMapping/>
+  </p:clrMapOvr>
+</p:sld>
+</file>
+
+<file path=ppt/slides/slide12.xml><?xml version="1.0" encoding="utf-8"?>
+<p:sld xmlns:a="http://schemas.openxmlformats.org/drawingml/2006/main" xmlns:r="http://schemas.openxmlformats.org/officeDocument/2006/relationships" xmlns:p="http://schemas.openxmlformats.org/presentationml/2006/main">
+  <p:cSld>
+    <p:spTree>
+      <p:nvGrpSpPr>
+        <p:cNvPr id="1" name=""/>
+        <p:cNvGrpSpPr/>
+        <p:nvPr/>
+      </p:nvGrpSpPr>
+      <p:grpSpPr>
+        <a:xfrm>
+          <a:off x="0" y="0"/>
+          <a:ext cx="0" cy="0"/>
+          <a:chOff x="0" y="0"/>
+          <a:chExt cx="0" cy="0"/>
+        </a:xfrm>
+      </p:grpSpPr>
+      <p:sp>
+        <p:nvSpPr>
+          <p:cNvPr id="2" name="Titel 1">
+            <a:extLst>
+              <a:ext uri="{FF2B5EF4-FFF2-40B4-BE49-F238E27FC236}">
+                <a16:creationId xmlns:a16="http://schemas.microsoft.com/office/drawing/2014/main" id="{AF311394-781D-4BF3-8CCD-B3078CBCE3BA}"/>
+              </a:ext>
+            </a:extLst>
+          </p:cNvPr>
+          <p:cNvSpPr>
+            <a:spLocks noGrp="1"/>
+          </p:cNvSpPr>
+          <p:nvPr>
+            <p:ph type="title"/>
+          </p:nvPr>
+        </p:nvSpPr>
+        <p:spPr/>
+        <p:txBody>
+          <a:bodyPr/>
+          <a:lstStyle/>
+          <a:p>
+            <a:r>
+              <a:rPr lang="de-DE" dirty="0"/>
+              <a:t>Bestimmung der Gitterkonstanten</a:t>
+            </a:r>
+          </a:p>
+        </p:txBody>
+      </p:sp>
+      <mc:AlternateContent xmlns:mc="http://schemas.openxmlformats.org/markup-compatibility/2006">
+        <mc:Choice xmlns:a14="http://schemas.microsoft.com/office/drawing/2010/main" Requires="a14">
+          <p:sp>
+            <p:nvSpPr>
+              <p:cNvPr id="3" name="Inhaltsplatzhalter 2">
+                <a:extLst>
+                  <a:ext uri="{FF2B5EF4-FFF2-40B4-BE49-F238E27FC236}">
+                    <a16:creationId xmlns:a16="http://schemas.microsoft.com/office/drawing/2014/main" id="{01B812A4-ABDF-4219-BC9E-B895BDBA4062}"/>
+                  </a:ext>
+                </a:extLst>
+              </p:cNvPr>
+              <p:cNvSpPr>
+                <a:spLocks noGrp="1"/>
+              </p:cNvSpPr>
+              <p:nvPr>
+                <p:ph idx="1"/>
+              </p:nvPr>
+            </p:nvSpPr>
+            <p:spPr>
+              <a:xfrm>
+                <a:off x="838199" y="1825625"/>
+                <a:ext cx="4150489" cy="4351338"/>
+              </a:xfrm>
+            </p:spPr>
+            <p:txBody>
+              <a:bodyPr/>
+              <a:lstStyle/>
+              <a:p>
+                <a:r>
+                  <a:rPr lang="de-DE" dirty="0"/>
+                  <a:t>Fit ohne Winkelkorrektur</a:t>
+                </a:r>
+              </a:p>
+              <a:p>
+                <a:endParaRPr lang="de-DE" dirty="0"/>
+              </a:p>
+              <a:p>
+                <a:r>
+                  <a:rPr lang="de-DE" dirty="0"/>
+                  <a:t>klare Systematik</a:t>
+                </a:r>
+              </a:p>
+              <a:p>
+                <a:endParaRPr lang="de-DE" dirty="0"/>
+              </a:p>
+              <a:p>
+                <a:r>
+                  <a:rPr lang="de-DE" dirty="0"/>
+                  <a:t>großes </a:t>
+                </a:r>
+                <a14:m>
+                  <m:oMath xmlns:m="http://schemas.openxmlformats.org/officeDocument/2006/math">
+                    <m:sSup>
+                      <m:sSupPr>
+                        <m:ctrlPr>
+                          <a:rPr lang="de-DE" b="0" i="1" smtClean="0">
+                            <a:latin typeface="Cambria Math" panose="02040503050406030204" pitchFamily="18" charset="0"/>
+                          </a:rPr>
+                        </m:ctrlPr>
+                      </m:sSupPr>
+                      <m:e>
+                        <m:r>
+                          <a:rPr lang="de-DE" b="0" i="1" smtClean="0">
+                            <a:latin typeface="Cambria Math" panose="02040503050406030204" pitchFamily="18" charset="0"/>
+                          </a:rPr>
+                          <m:t>𝜒</m:t>
+                        </m:r>
+                      </m:e>
+                      <m:sup>
+                        <m:r>
+                          <a:rPr lang="de-DE" b="0" i="1" smtClean="0">
+                            <a:latin typeface="Cambria Math" panose="02040503050406030204" pitchFamily="18" charset="0"/>
+                          </a:rPr>
+                          <m:t>2</m:t>
+                        </m:r>
+                      </m:sup>
+                    </m:sSup>
+                  </m:oMath>
+                </a14:m>
+                <a:endParaRPr lang="de-DE" dirty="0"/>
+              </a:p>
+            </p:txBody>
+          </p:sp>
+        </mc:Choice>
+        <mc:Fallback>
+          <p:sp>
+            <p:nvSpPr>
+              <p:cNvPr id="3" name="Inhaltsplatzhalter 2">
+                <a:extLst>
+                  <a:ext uri="{FF2B5EF4-FFF2-40B4-BE49-F238E27FC236}">
+                    <a16:creationId xmlns:a16="http://schemas.microsoft.com/office/drawing/2014/main" id="{01B812A4-ABDF-4219-BC9E-B895BDBA4062}"/>
+                  </a:ext>
+                </a:extLst>
+              </p:cNvPr>
+              <p:cNvSpPr>
+                <a:spLocks noGrp="1" noRot="1" noChangeAspect="1" noMove="1" noResize="1" noEditPoints="1" noAdjustHandles="1" noChangeArrowheads="1" noChangeShapeType="1" noTextEdit="1"/>
+              </p:cNvSpPr>
+              <p:nvPr>
+                <p:ph idx="1"/>
+              </p:nvPr>
+            </p:nvSpPr>
+            <p:spPr>
+              <a:xfrm>
+                <a:off x="838199" y="1825625"/>
+                <a:ext cx="4150489" cy="4351338"/>
+              </a:xfrm>
+              <a:blipFill>
+                <a:blip r:embed="rId2"/>
+                <a:stretch>
+                  <a:fillRect l="-2496" t="-2241"/>
+                </a:stretch>
+              </a:blipFill>
+            </p:spPr>
+            <p:txBody>
+              <a:bodyPr/>
+              <a:lstStyle/>
+              <a:p>
+                <a:r>
+                  <a:rPr lang="de-DE">
+                    <a:noFill/>
+                  </a:rPr>
+                  <a:t> </a:t>
+                </a:r>
+              </a:p>
+            </p:txBody>
+          </p:sp>
+        </mc:Fallback>
+      </mc:AlternateContent>
+      <p:pic>
+        <p:nvPicPr>
+          <p:cNvPr id="7" name="Grafik 6">
+            <a:extLst>
+              <a:ext uri="{FF2B5EF4-FFF2-40B4-BE49-F238E27FC236}">
+                <a16:creationId xmlns:a16="http://schemas.microsoft.com/office/drawing/2014/main" id="{BD8C2CD5-08C5-43B2-A9F1-20D15BF02C2D}"/>
+              </a:ext>
+            </a:extLst>
+          </p:cNvPr>
+          <p:cNvPicPr>
+            <a:picLocks noChangeAspect="1"/>
+          </p:cNvPicPr>
+          <p:nvPr/>
+        </p:nvPicPr>
+        <p:blipFill>
+          <a:blip r:embed="rId3">
+            <a:extLst>
+              <a:ext uri="{28A0092B-C50C-407E-A947-70E740481C1C}">
+                <a14:useLocalDpi xmlns:a14="http://schemas.microsoft.com/office/drawing/2010/main" val="0"/>
+              </a:ext>
+            </a:extLst>
+          </a:blip>
+          <a:stretch>
+            <a:fillRect/>
+          </a:stretch>
+        </p:blipFill>
+        <p:spPr>
+          <a:xfrm>
+            <a:off x="5623746" y="1486647"/>
+            <a:ext cx="6279921" cy="4690316"/>
+          </a:xfrm>
+          <a:prstGeom prst="rect">
+            <a:avLst/>
+          </a:prstGeom>
+        </p:spPr>
+      </p:pic>
+    </p:spTree>
+    <p:extLst>
+      <p:ext uri="{BB962C8B-B14F-4D97-AF65-F5344CB8AC3E}">
+        <p14:creationId xmlns:p14="http://schemas.microsoft.com/office/powerpoint/2010/main" val="703287718"/>
+      </p:ext>
+    </p:extLst>
+  </p:cSld>
+  <p:clrMapOvr>
+    <a:masterClrMapping/>
+  </p:clrMapOvr>
+</p:sld>
+</file>
+
+<file path=ppt/slides/slide13.xml><?xml version="1.0" encoding="utf-8"?>
+<p:sld xmlns:a="http://schemas.openxmlformats.org/drawingml/2006/main" xmlns:r="http://schemas.openxmlformats.org/officeDocument/2006/relationships" xmlns:p="http://schemas.openxmlformats.org/presentationml/2006/main">
+  <p:cSld>
+    <p:spTree>
+      <p:nvGrpSpPr>
+        <p:cNvPr id="1" name=""/>
+        <p:cNvGrpSpPr/>
+        <p:nvPr/>
+      </p:nvGrpSpPr>
+      <p:grpSpPr>
+        <a:xfrm>
+          <a:off x="0" y="0"/>
+          <a:ext cx="0" cy="0"/>
+          <a:chOff x="0" y="0"/>
+          <a:chExt cx="0" cy="0"/>
+        </a:xfrm>
+      </p:grpSpPr>
+      <p:sp>
+        <p:nvSpPr>
+          <p:cNvPr id="2" name="Titel 1">
+            <a:extLst>
+              <a:ext uri="{FF2B5EF4-FFF2-40B4-BE49-F238E27FC236}">
+                <a16:creationId xmlns:a16="http://schemas.microsoft.com/office/drawing/2014/main" id="{8F9B582B-7F42-4822-A4D4-7D26D621B192}"/>
+              </a:ext>
+            </a:extLst>
+          </p:cNvPr>
+          <p:cNvSpPr>
+            <a:spLocks noGrp="1"/>
+          </p:cNvSpPr>
+          <p:nvPr>
+            <p:ph type="title"/>
+          </p:nvPr>
+        </p:nvSpPr>
+        <p:spPr/>
+        <p:txBody>
+          <a:bodyPr/>
+          <a:lstStyle/>
+          <a:p>
+            <a:r>
+              <a:rPr lang="de-DE" dirty="0"/>
+              <a:t>Bestimmung der Gitterkonstanten</a:t>
+            </a:r>
+          </a:p>
+        </p:txBody>
+      </p:sp>
+      <mc:AlternateContent xmlns:mc="http://schemas.openxmlformats.org/markup-compatibility/2006">
+        <mc:Choice xmlns:a14="http://schemas.microsoft.com/office/drawing/2010/main" Requires="a14">
+          <p:sp>
+            <p:nvSpPr>
+              <p:cNvPr id="3" name="Inhaltsplatzhalter 2">
+                <a:extLst>
+                  <a:ext uri="{FF2B5EF4-FFF2-40B4-BE49-F238E27FC236}">
+                    <a16:creationId xmlns:a16="http://schemas.microsoft.com/office/drawing/2014/main" id="{A9EA2230-2903-46E6-89D9-2FBF48B57FFB}"/>
+                  </a:ext>
+                </a:extLst>
+              </p:cNvPr>
+              <p:cNvSpPr>
+                <a:spLocks noGrp="1"/>
+              </p:cNvSpPr>
+              <p:nvPr>
+                <p:ph idx="1"/>
+              </p:nvPr>
+            </p:nvSpPr>
+            <p:spPr>
+              <a:xfrm>
+                <a:off x="838200" y="1825625"/>
+                <a:ext cx="5284808" cy="4351338"/>
+              </a:xfrm>
+            </p:spPr>
+            <p:txBody>
+              <a:bodyPr/>
+              <a:lstStyle/>
+              <a:p>
+                <a14:m>
+                  <m:oMath xmlns:m="http://schemas.openxmlformats.org/officeDocument/2006/math">
+                    <m:r>
+                      <a:rPr lang="de-DE" b="0" i="1" smtClean="0">
+                        <a:latin typeface="Cambria Math" panose="02040503050406030204" pitchFamily="18" charset="0"/>
+                      </a:rPr>
+                      <m:t>𝑑</m:t>
+                    </m:r>
+                    <m:r>
+                      <a:rPr lang="de-DE" b="0" i="1" smtClean="0">
+                        <a:latin typeface="Cambria Math" panose="02040503050406030204" pitchFamily="18" charset="0"/>
+                      </a:rPr>
+                      <m:t>= </m:t>
+                    </m:r>
+                    <m:f>
+                      <m:fPr>
+                        <m:ctrlPr>
+                          <a:rPr lang="de-DE" b="0" i="1" smtClean="0">
+                            <a:latin typeface="Cambria Math" panose="02040503050406030204" pitchFamily="18" charset="0"/>
+                          </a:rPr>
+                        </m:ctrlPr>
+                      </m:fPr>
+                      <m:num>
+                        <m:r>
+                          <a:rPr lang="de-DE" b="0" i="1" smtClean="0">
+                            <a:latin typeface="Cambria Math" panose="02040503050406030204" pitchFamily="18" charset="0"/>
+                          </a:rPr>
+                          <m:t>1</m:t>
+                        </m:r>
+                      </m:num>
+                      <m:den>
+                        <m:r>
+                          <a:rPr lang="de-DE" b="0" i="1" smtClean="0">
+                            <a:latin typeface="Cambria Math" panose="02040503050406030204" pitchFamily="18" charset="0"/>
+                          </a:rPr>
+                          <m:t>𝑎</m:t>
+                        </m:r>
+                      </m:den>
+                    </m:f>
+                    <m:r>
+                      <a:rPr lang="de-DE" b="0" i="1" smtClean="0">
+                        <a:latin typeface="Cambria Math" panose="02040503050406030204" pitchFamily="18" charset="0"/>
+                      </a:rPr>
+                      <m:t>≈1658,9 </m:t>
+                    </m:r>
+                    <m:r>
+                      <a:rPr lang="de-DE" b="0" i="1" smtClean="0">
+                        <a:latin typeface="Cambria Math" panose="02040503050406030204" pitchFamily="18" charset="0"/>
+                      </a:rPr>
+                      <m:t>𝑛𝑚</m:t>
+                    </m:r>
+                  </m:oMath>
+                </a14:m>
+                <a:endParaRPr lang="de-DE" dirty="0"/>
+              </a:p>
+              <a:p>
+                <a:endParaRPr lang="de-DE" dirty="0"/>
+              </a:p>
+              <a:p>
+                <a14:m>
+                  <m:oMath xmlns:m="http://schemas.openxmlformats.org/officeDocument/2006/math">
+                    <m:sSub>
+                      <m:sSubPr>
+                        <m:ctrlPr>
+                          <a:rPr lang="de-DE" b="0" i="1" smtClean="0">
+                            <a:latin typeface="Cambria Math" panose="02040503050406030204" pitchFamily="18" charset="0"/>
+                          </a:rPr>
+                        </m:ctrlPr>
+                      </m:sSubPr>
+                      <m:e>
+                        <m:r>
+                          <a:rPr lang="de-DE" b="0" i="1" smtClean="0">
+                            <a:latin typeface="Cambria Math" panose="02040503050406030204" pitchFamily="18" charset="0"/>
+                          </a:rPr>
+                          <m:t>𝜎</m:t>
+                        </m:r>
+                      </m:e>
+                      <m:sub>
+                        <m:r>
+                          <a:rPr lang="de-DE" b="0" i="1" smtClean="0">
+                            <a:latin typeface="Cambria Math" panose="02040503050406030204" pitchFamily="18" charset="0"/>
+                          </a:rPr>
+                          <m:t>𝑑</m:t>
+                        </m:r>
+                      </m:sub>
+                    </m:sSub>
+                    <m:r>
+                      <a:rPr lang="de-DE" b="0" i="1" smtClean="0">
+                        <a:latin typeface="Cambria Math" panose="02040503050406030204" pitchFamily="18" charset="0"/>
+                      </a:rPr>
+                      <m:t>=</m:t>
+                    </m:r>
+                    <m:sSub>
+                      <m:sSubPr>
+                        <m:ctrlPr>
+                          <a:rPr lang="de-DE" b="0" i="1" smtClean="0">
+                            <a:latin typeface="Cambria Math" panose="02040503050406030204" pitchFamily="18" charset="0"/>
+                          </a:rPr>
+                        </m:ctrlPr>
+                      </m:sSubPr>
+                      <m:e>
+                        <m:r>
+                          <a:rPr lang="de-DE" b="0" i="1" smtClean="0">
+                            <a:latin typeface="Cambria Math" panose="02040503050406030204" pitchFamily="18" charset="0"/>
+                          </a:rPr>
+                          <m:t>𝜎</m:t>
+                        </m:r>
+                      </m:e>
+                      <m:sub>
+                        <m:r>
+                          <a:rPr lang="de-DE" b="0" i="1" smtClean="0">
+                            <a:latin typeface="Cambria Math" panose="02040503050406030204" pitchFamily="18" charset="0"/>
+                          </a:rPr>
+                          <m:t>𝑎</m:t>
+                        </m:r>
+                      </m:sub>
+                    </m:sSub>
+                    <m:r>
+                      <a:rPr lang="de-DE" b="0" i="1" smtClean="0">
+                        <a:latin typeface="Cambria Math" panose="02040503050406030204" pitchFamily="18" charset="0"/>
+                      </a:rPr>
+                      <m:t>⋅</m:t>
+                    </m:r>
+                    <m:f>
+                      <m:fPr>
+                        <m:ctrlPr>
+                          <a:rPr lang="de-DE" b="0" i="1" smtClean="0">
+                            <a:latin typeface="Cambria Math" panose="02040503050406030204" pitchFamily="18" charset="0"/>
+                          </a:rPr>
+                        </m:ctrlPr>
+                      </m:fPr>
+                      <m:num>
+                        <m:r>
+                          <a:rPr lang="de-DE" b="0" i="1" smtClean="0">
+                            <a:latin typeface="Cambria Math" panose="02040503050406030204" pitchFamily="18" charset="0"/>
+                          </a:rPr>
+                          <m:t>𝑑</m:t>
+                        </m:r>
+                      </m:num>
+                      <m:den>
+                        <m:r>
+                          <a:rPr lang="de-DE" b="0" i="1" smtClean="0">
+                            <a:latin typeface="Cambria Math" panose="02040503050406030204" pitchFamily="18" charset="0"/>
+                          </a:rPr>
+                          <m:t>𝑎</m:t>
+                        </m:r>
+                      </m:den>
+                    </m:f>
+                    <m:r>
+                      <a:rPr lang="de-DE" b="0" i="1" smtClean="0">
+                        <a:latin typeface="Cambria Math" panose="02040503050406030204" pitchFamily="18" charset="0"/>
+                      </a:rPr>
+                      <m:t>≈0.34 </m:t>
+                    </m:r>
+                    <m:r>
+                      <a:rPr lang="de-DE" b="0" i="1" smtClean="0">
+                        <a:latin typeface="Cambria Math" panose="02040503050406030204" pitchFamily="18" charset="0"/>
+                      </a:rPr>
+                      <m:t>𝑛𝑚</m:t>
+                    </m:r>
+                  </m:oMath>
+                </a14:m>
+                <a:endParaRPr lang="de-DE" dirty="0"/>
+              </a:p>
+              <a:p>
+                <a:endParaRPr lang="de-DE" dirty="0"/>
+              </a:p>
+              <a:p>
+                <a:r>
+                  <a:rPr lang="de-DE" dirty="0"/>
+                  <a:t>Herstellerangabe:</a:t>
+                </a:r>
+              </a:p>
+              <a:p>
+                <a:pPr marL="0" indent="0">
+                  <a:buNone/>
+                </a:pPr>
+                <a14:m>
+                  <m:oMathPara xmlns:m="http://schemas.openxmlformats.org/officeDocument/2006/math">
+                    <m:oMathParaPr>
+                      <m:jc m:val="centerGroup"/>
+                    </m:oMathParaPr>
+                    <m:oMath xmlns:m="http://schemas.openxmlformats.org/officeDocument/2006/math">
+                      <m:sSub>
+                        <m:sSubPr>
+                          <m:ctrlPr>
+                            <a:rPr lang="de-DE" b="0" i="1" smtClean="0">
+                              <a:latin typeface="Cambria Math" panose="02040503050406030204" pitchFamily="18" charset="0"/>
+                            </a:rPr>
+                          </m:ctrlPr>
+                        </m:sSubPr>
+                        <m:e>
+                          <m:r>
+                            <a:rPr lang="de-DE" b="0" i="1" smtClean="0">
+                              <a:latin typeface="Cambria Math" panose="02040503050406030204" pitchFamily="18" charset="0"/>
+                            </a:rPr>
+                            <m:t>𝑑</m:t>
+                          </m:r>
+                        </m:e>
+                        <m:sub>
+                          <m:r>
+                            <a:rPr lang="de-DE" b="0" i="1" smtClean="0">
+                              <a:latin typeface="Cambria Math" panose="02040503050406030204" pitchFamily="18" charset="0"/>
+                            </a:rPr>
+                            <m:t>𝐻𝑒𝑟𝑠𝑡𝑒𝑙𝑙𝑒𝑟</m:t>
+                          </m:r>
+                        </m:sub>
+                      </m:sSub>
+                      <m:r>
+                        <a:rPr lang="de-DE" b="0" i="1" smtClean="0">
+                          <a:latin typeface="Cambria Math" panose="02040503050406030204" pitchFamily="18" charset="0"/>
+                        </a:rPr>
+                        <m:t>≈1666,67 </m:t>
+                      </m:r>
+                      <m:r>
+                        <a:rPr lang="de-DE" b="0" i="1" smtClean="0">
+                          <a:latin typeface="Cambria Math" panose="02040503050406030204" pitchFamily="18" charset="0"/>
+                        </a:rPr>
+                        <m:t>𝑛𝑚</m:t>
+                      </m:r>
+                    </m:oMath>
+                  </m:oMathPara>
+                </a14:m>
+                <a:endParaRPr lang="de-DE" dirty="0"/>
+              </a:p>
+            </p:txBody>
+          </p:sp>
+        </mc:Choice>
+        <mc:Fallback>
+          <p:sp>
+            <p:nvSpPr>
+              <p:cNvPr id="3" name="Inhaltsplatzhalter 2">
+                <a:extLst>
+                  <a:ext uri="{FF2B5EF4-FFF2-40B4-BE49-F238E27FC236}">
+                    <a16:creationId xmlns:a16="http://schemas.microsoft.com/office/drawing/2014/main" id="{A9EA2230-2903-46E6-89D9-2FBF48B57FFB}"/>
+                  </a:ext>
+                </a:extLst>
+              </p:cNvPr>
+              <p:cNvSpPr>
+                <a:spLocks noGrp="1" noRot="1" noChangeAspect="1" noMove="1" noResize="1" noEditPoints="1" noAdjustHandles="1" noChangeArrowheads="1" noChangeShapeType="1" noTextEdit="1"/>
+              </p:cNvSpPr>
+              <p:nvPr>
+                <p:ph idx="1"/>
+              </p:nvPr>
+            </p:nvSpPr>
+            <p:spPr>
+              <a:xfrm>
+                <a:off x="838200" y="1825625"/>
+                <a:ext cx="5284808" cy="4351338"/>
+              </a:xfrm>
+              <a:blipFill>
+                <a:blip r:embed="rId2"/>
+                <a:stretch>
+                  <a:fillRect l="-2079"/>
+                </a:stretch>
+              </a:blipFill>
+            </p:spPr>
+            <p:txBody>
+              <a:bodyPr/>
+              <a:lstStyle/>
+              <a:p>
+                <a:r>
+                  <a:rPr lang="de-DE">
+                    <a:noFill/>
+                  </a:rPr>
+                  <a:t> </a:t>
+                </a:r>
+              </a:p>
+            </p:txBody>
+          </p:sp>
+        </mc:Fallback>
+      </mc:AlternateContent>
+      <p:pic>
+        <p:nvPicPr>
+          <p:cNvPr id="5" name="Grafik 4">
+            <a:extLst>
+              <a:ext uri="{FF2B5EF4-FFF2-40B4-BE49-F238E27FC236}">
+                <a16:creationId xmlns:a16="http://schemas.microsoft.com/office/drawing/2014/main" id="{8A2460AB-886A-4359-B8F5-D80A391D596A}"/>
+              </a:ext>
+            </a:extLst>
+          </p:cNvPr>
+          <p:cNvPicPr>
+            <a:picLocks noChangeAspect="1"/>
+          </p:cNvPicPr>
+          <p:nvPr/>
+        </p:nvPicPr>
+        <p:blipFill>
+          <a:blip r:embed="rId3">
+            <a:extLst>
+              <a:ext uri="{28A0092B-C50C-407E-A947-70E740481C1C}">
+                <a14:useLocalDpi xmlns:a14="http://schemas.microsoft.com/office/drawing/2010/main" val="0"/>
+              </a:ext>
+            </a:extLst>
+          </a:blip>
+          <a:stretch>
+            <a:fillRect/>
+          </a:stretch>
+        </p:blipFill>
+        <p:spPr>
+          <a:xfrm>
+            <a:off x="6339828" y="1243579"/>
+            <a:ext cx="5852172" cy="4370841"/>
+          </a:xfrm>
+          <a:prstGeom prst="rect">
+            <a:avLst/>
+          </a:prstGeom>
+        </p:spPr>
+      </p:pic>
+    </p:spTree>
+    <p:extLst>
+      <p:ext uri="{BB962C8B-B14F-4D97-AF65-F5344CB8AC3E}">
+        <p14:creationId xmlns:p14="http://schemas.microsoft.com/office/powerpoint/2010/main" val="2285038374"/>
       </p:ext>
     </p:extLst>
   </p:cSld>

</xml_diff>